<commit_message>
Correction in the beta angle of the bicycle model picture.
</commit_message>
<xml_diff>
--- a/01_ProjectManagement/02_Meetings/20201108_Email_ModeloVehiculoInicial/20201108_ModeloVehiculoInicial_BorjaPintos.pptx
+++ b/01_ProjectManagement/02_Meetings/20201108_Email_ModeloVehiculoInicial/20201108_ModeloVehiculoInicial_BorjaPintos.pptx
@@ -3372,121 +3372,274 @@
     </pc:docChg>
   </pc:docChgLst>
   <pc:docChgLst>
-    <pc:chgData name="Borja Pintos Gómez de las Heras" userId="2d8300179f355a51" providerId="Windows Live" clId="Web-{40119FD6-485C-4960-9716-29943F131C2B}"/>
-    <pc:docChg chg="addSld modSld sldOrd">
-      <pc:chgData name="Borja Pintos Gómez de las Heras" userId="2d8300179f355a51" providerId="Windows Live" clId="Web-{40119FD6-485C-4960-9716-29943F131C2B}" dt="2020-02-29T11:45:43.086" v="73"/>
+    <pc:chgData name="Borja Pintos Gómez de las Heras" userId="2d8300179f355a51" providerId="LiveId" clId="{46E9778C-D13C-412A-B087-5A8A2C9F16ED}"/>
+    <pc:docChg chg="undo custSel addSld modSld">
+      <pc:chgData name="Borja Pintos Gómez de las Heras" userId="2d8300179f355a51" providerId="LiveId" clId="{46E9778C-D13C-412A-B087-5A8A2C9F16ED}" dt="2019-09-10T10:25:58.296" v="1804" actId="1076"/>
       <pc:docMkLst>
         <pc:docMk/>
       </pc:docMkLst>
-      <pc:sldChg chg="addSp delSp modSp add replId">
-        <pc:chgData name="Borja Pintos Gómez de las Heras" userId="2d8300179f355a51" providerId="Windows Live" clId="Web-{40119FD6-485C-4960-9716-29943F131C2B}" dt="2020-02-29T09:51:09.869" v="57" actId="1076"/>
+      <pc:sldChg chg="addSp delSp modSp add">
+        <pc:chgData name="Borja Pintos Gómez de las Heras" userId="2d8300179f355a51" providerId="LiveId" clId="{46E9778C-D13C-412A-B087-5A8A2C9F16ED}" dt="2019-09-10T10:25:58.296" v="1804" actId="1076"/>
         <pc:sldMkLst>
           <pc:docMk/>
-          <pc:sldMk cId="757090546" sldId="272"/>
+          <pc:sldMk cId="210989054" sldId="265"/>
         </pc:sldMkLst>
-        <pc:spChg chg="add mod">
-          <ac:chgData name="Borja Pintos Gómez de las Heras" userId="2d8300179f355a51" providerId="Windows Live" clId="Web-{40119FD6-485C-4960-9716-29943F131C2B}" dt="2020-02-29T09:51:09.869" v="57" actId="1076"/>
-          <ac:spMkLst>
-            <pc:docMk/>
-            <pc:sldMk cId="757090546" sldId="272"/>
-            <ac:spMk id="6" creationId="{E515472E-848D-41C6-A29E-215523C8A9B0}"/>
-          </ac:spMkLst>
-        </pc:spChg>
-        <pc:picChg chg="add mod">
-          <ac:chgData name="Borja Pintos Gómez de las Heras" userId="2d8300179f355a51" providerId="Windows Live" clId="Web-{40119FD6-485C-4960-9716-29943F131C2B}" dt="2020-02-29T09:50:38.634" v="48" actId="14100"/>
+        <pc:spChg chg="mod">
+          <ac:chgData name="Borja Pintos Gómez de las Heras" userId="2d8300179f355a51" providerId="LiveId" clId="{46E9778C-D13C-412A-B087-5A8A2C9F16ED}" dt="2019-09-10T09:33:56.905" v="10" actId="20577"/>
+          <ac:spMkLst>
+            <pc:docMk/>
+            <pc:sldMk cId="210989054" sldId="265"/>
+            <ac:spMk id="2" creationId="{8C86EEF0-507D-4A7E-B493-2FCCBE8AABF0}"/>
+          </ac:spMkLst>
+        </pc:spChg>
+        <pc:spChg chg="mod">
+          <ac:chgData name="Borja Pintos Gómez de las Heras" userId="2d8300179f355a51" providerId="LiveId" clId="{46E9778C-D13C-412A-B087-5A8A2C9F16ED}" dt="2019-09-10T10:17:07.959" v="1739" actId="14100"/>
+          <ac:spMkLst>
+            <pc:docMk/>
+            <pc:sldMk cId="210989054" sldId="265"/>
+            <ac:spMk id="3" creationId="{8D1F8D79-35C0-4572-A705-DEC06E75823A}"/>
+          </ac:spMkLst>
+        </pc:spChg>
+        <pc:spChg chg="del">
+          <ac:chgData name="Borja Pintos Gómez de las Heras" userId="2d8300179f355a51" providerId="LiveId" clId="{46E9778C-D13C-412A-B087-5A8A2C9F16ED}" dt="2019-09-10T09:37:19.522" v="124" actId="478"/>
+          <ac:spMkLst>
+            <pc:docMk/>
+            <pc:sldMk cId="210989054" sldId="265"/>
+            <ac:spMk id="4" creationId="{ABB03064-2293-4FE6-99F6-C18CDB8F67FD}"/>
+          </ac:spMkLst>
+        </pc:spChg>
+        <pc:spChg chg="del">
+          <ac:chgData name="Borja Pintos Gómez de las Heras" userId="2d8300179f355a51" providerId="LiveId" clId="{46E9778C-D13C-412A-B087-5A8A2C9F16ED}" dt="2019-09-10T09:37:19.522" v="124" actId="478"/>
+          <ac:spMkLst>
+            <pc:docMk/>
+            <pc:sldMk cId="210989054" sldId="265"/>
+            <ac:spMk id="7" creationId="{DEDDF3A4-E642-4934-8AA0-5DABD9BE3E2E}"/>
+          </ac:spMkLst>
+        </pc:spChg>
+        <pc:spChg chg="del">
+          <ac:chgData name="Borja Pintos Gómez de las Heras" userId="2d8300179f355a51" providerId="LiveId" clId="{46E9778C-D13C-412A-B087-5A8A2C9F16ED}" dt="2019-09-10T09:37:19.522" v="124" actId="478"/>
+          <ac:spMkLst>
+            <pc:docMk/>
+            <pc:sldMk cId="210989054" sldId="265"/>
+            <ac:spMk id="11" creationId="{90806B90-9E5B-4F6D-B316-7DBD1AB9B0F4}"/>
+          </ac:spMkLst>
+        </pc:spChg>
+        <pc:spChg chg="del">
+          <ac:chgData name="Borja Pintos Gómez de las Heras" userId="2d8300179f355a51" providerId="LiveId" clId="{46E9778C-D13C-412A-B087-5A8A2C9F16ED}" dt="2019-09-10T09:37:21.248" v="125" actId="478"/>
+          <ac:spMkLst>
+            <pc:docMk/>
+            <pc:sldMk cId="210989054" sldId="265"/>
+            <ac:spMk id="13" creationId="{FE57C4C3-3C0E-43E9-97DA-B08283C1B83F}"/>
+          </ac:spMkLst>
+        </pc:spChg>
+        <pc:spChg chg="del">
+          <ac:chgData name="Borja Pintos Gómez de las Heras" userId="2d8300179f355a51" providerId="LiveId" clId="{46E9778C-D13C-412A-B087-5A8A2C9F16ED}" dt="2019-09-10T09:37:19.522" v="124" actId="478"/>
+          <ac:spMkLst>
+            <pc:docMk/>
+            <pc:sldMk cId="210989054" sldId="265"/>
+            <ac:spMk id="18" creationId="{F29B997D-DBAA-4172-A2D0-1473AEBBD0A5}"/>
+          </ac:spMkLst>
+        </pc:spChg>
+        <pc:spChg chg="del">
+          <ac:chgData name="Borja Pintos Gómez de las Heras" userId="2d8300179f355a51" providerId="LiveId" clId="{46E9778C-D13C-412A-B087-5A8A2C9F16ED}" dt="2019-09-10T09:37:19.522" v="124" actId="478"/>
+          <ac:spMkLst>
+            <pc:docMk/>
+            <pc:sldMk cId="210989054" sldId="265"/>
+            <ac:spMk id="19" creationId="{2C1B7245-A5B0-45D0-89C7-5E6C8CD122B3}"/>
+          </ac:spMkLst>
+        </pc:spChg>
+        <pc:spChg chg="add del mod">
+          <ac:chgData name="Borja Pintos Gómez de las Heras" userId="2d8300179f355a51" providerId="LiveId" clId="{46E9778C-D13C-412A-B087-5A8A2C9F16ED}" dt="2019-09-10T10:22:52.796" v="1752" actId="478"/>
+          <ac:spMkLst>
+            <pc:docMk/>
+            <pc:sldMk cId="210989054" sldId="265"/>
+            <ac:spMk id="25" creationId="{935D7678-5C39-4688-B188-5C1D11D2F828}"/>
+          </ac:spMkLst>
+        </pc:spChg>
+        <pc:spChg chg="add del mod">
+          <ac:chgData name="Borja Pintos Gómez de las Heras" userId="2d8300179f355a51" providerId="LiveId" clId="{46E9778C-D13C-412A-B087-5A8A2C9F16ED}" dt="2019-09-10T10:23:39.236" v="1758" actId="478"/>
+          <ac:spMkLst>
+            <pc:docMk/>
+            <pc:sldMk cId="210989054" sldId="265"/>
+            <ac:spMk id="28" creationId="{7B2B0F1E-D0EC-4390-BBBA-A358C3B7C55B}"/>
+          </ac:spMkLst>
+        </pc:spChg>
+        <pc:spChg chg="add del mod">
+          <ac:chgData name="Borja Pintos Gómez de las Heras" userId="2d8300179f355a51" providerId="LiveId" clId="{46E9778C-D13C-412A-B087-5A8A2C9F16ED}" dt="2019-09-10T10:24:16.866" v="1768" actId="478"/>
+          <ac:spMkLst>
+            <pc:docMk/>
+            <pc:sldMk cId="210989054" sldId="265"/>
+            <ac:spMk id="31" creationId="{CB96801D-9560-4573-9042-821E9C241A70}"/>
+          </ac:spMkLst>
+        </pc:spChg>
+        <pc:grpChg chg="add del mod">
+          <ac:chgData name="Borja Pintos Gómez de las Heras" userId="2d8300179f355a51" providerId="LiveId" clId="{46E9778C-D13C-412A-B087-5A8A2C9F16ED}" dt="2019-09-10T10:16:48.816" v="1729" actId="478"/>
+          <ac:grpSpMkLst>
+            <pc:docMk/>
+            <pc:sldMk cId="210989054" sldId="265"/>
+            <ac:grpSpMk id="20" creationId="{2992E48E-4956-4524-BF77-EF6AFCD851B1}"/>
+          </ac:grpSpMkLst>
+        </pc:grpChg>
+        <pc:picChg chg="add del mod">
+          <ac:chgData name="Borja Pintos Gómez de las Heras" userId="2d8300179f355a51" providerId="LiveId" clId="{46E9778C-D13C-412A-B087-5A8A2C9F16ED}" dt="2019-09-10T10:22:52.796" v="1752" actId="478"/>
           <ac:picMkLst>
             <pc:docMk/>
-            <pc:sldMk cId="757090546" sldId="272"/>
-            <ac:picMk id="2" creationId="{22219C0C-5A90-4368-AEDF-6B409776EE94}"/>
+            <pc:sldMk cId="210989054" sldId="265"/>
+            <ac:picMk id="15" creationId="{C1AA2CA9-ECF6-4E5F-AA3E-BEDDDC45E5DD}"/>
           </ac:picMkLst>
         </pc:picChg>
-        <pc:picChg chg="del">
-          <ac:chgData name="Borja Pintos Gómez de las Heras" userId="2d8300179f355a51" providerId="Windows Live" clId="Web-{40119FD6-485C-4960-9716-29943F131C2B}" dt="2020-02-29T09:46:25.929" v="1"/>
+        <pc:picChg chg="mod topLvl">
+          <ac:chgData name="Borja Pintos Gómez de las Heras" userId="2d8300179f355a51" providerId="LiveId" clId="{46E9778C-D13C-412A-B087-5A8A2C9F16ED}" dt="2019-09-10T10:19:15.936" v="1745" actId="1076"/>
           <ac:picMkLst>
             <pc:docMk/>
-            <pc:sldMk cId="757090546" sldId="272"/>
-            <ac:picMk id="3" creationId="{C5C3C493-7C12-434A-9DE1-62EA04FE518F}"/>
+            <pc:sldMk cId="210989054" sldId="265"/>
+            <ac:picMk id="21" creationId="{C63623EC-8823-4FE3-83D1-5A1E85E94527}"/>
+          </ac:picMkLst>
+        </pc:picChg>
+        <pc:picChg chg="add del mod">
+          <ac:chgData name="Borja Pintos Gómez de las Heras" userId="2d8300179f355a51" providerId="LiveId" clId="{46E9778C-D13C-412A-B087-5A8A2C9F16ED}" dt="2019-09-10T10:23:52.921" v="1763" actId="478"/>
+          <ac:picMkLst>
+            <pc:docMk/>
+            <pc:sldMk cId="210989054" sldId="265"/>
+            <ac:picMk id="27" creationId="{B9FE0695-A2D4-430E-8066-17C72C990C31}"/>
+          </ac:picMkLst>
+        </pc:picChg>
+        <pc:picChg chg="add mod">
+          <ac:chgData name="Borja Pintos Gómez de las Heras" userId="2d8300179f355a51" providerId="LiveId" clId="{46E9778C-D13C-412A-B087-5A8A2C9F16ED}" dt="2019-09-10T10:24:26.182" v="1772" actId="1076"/>
+          <ac:picMkLst>
+            <pc:docMk/>
+            <pc:sldMk cId="210989054" sldId="265"/>
+            <ac:picMk id="30" creationId="{03840EFE-0495-4DD0-809B-E789F3EB189E}"/>
+          </ac:picMkLst>
+        </pc:picChg>
+        <pc:picChg chg="add mod">
+          <ac:chgData name="Borja Pintos Gómez de las Heras" userId="2d8300179f355a51" providerId="LiveId" clId="{46E9778C-D13C-412A-B087-5A8A2C9F16ED}" dt="2019-09-10T10:24:50.306" v="1778" actId="1076"/>
+          <ac:picMkLst>
+            <pc:docMk/>
+            <pc:sldMk cId="210989054" sldId="265"/>
+            <ac:picMk id="32" creationId="{344B4EC8-4F80-4320-A0CC-649F9D26ACB7}"/>
+          </ac:picMkLst>
+        </pc:picChg>
+        <pc:picChg chg="add mod">
+          <ac:chgData name="Borja Pintos Gómez de las Heras" userId="2d8300179f355a51" providerId="LiveId" clId="{46E9778C-D13C-412A-B087-5A8A2C9F16ED}" dt="2019-09-10T10:25:54.687" v="1803" actId="1076"/>
+          <ac:picMkLst>
+            <pc:docMk/>
+            <pc:sldMk cId="210989054" sldId="265"/>
+            <ac:picMk id="33" creationId="{289B0977-C2EF-45F5-9235-FF834719E64A}"/>
+          </ac:picMkLst>
+        </pc:picChg>
+        <pc:picChg chg="add mod">
+          <ac:chgData name="Borja Pintos Gómez de las Heras" userId="2d8300179f355a51" providerId="LiveId" clId="{46E9778C-D13C-412A-B087-5A8A2C9F16ED}" dt="2019-09-10T10:25:38.633" v="1796" actId="1076"/>
+          <ac:picMkLst>
+            <pc:docMk/>
+            <pc:sldMk cId="210989054" sldId="265"/>
+            <ac:picMk id="34" creationId="{971C9603-E963-427D-9CFC-E7AC62406909}"/>
+          </ac:picMkLst>
+        </pc:picChg>
+        <pc:picChg chg="add mod">
+          <ac:chgData name="Borja Pintos Gómez de las Heras" userId="2d8300179f355a51" providerId="LiveId" clId="{46E9778C-D13C-412A-B087-5A8A2C9F16ED}" dt="2019-09-10T10:25:58.296" v="1804" actId="1076"/>
+          <ac:picMkLst>
+            <pc:docMk/>
+            <pc:sldMk cId="210989054" sldId="265"/>
+            <ac:picMk id="35" creationId="{68BC9635-6D07-400E-B26F-12D3E055849B}"/>
+          </ac:picMkLst>
+        </pc:picChg>
+        <pc:picChg chg="add del mod">
+          <ac:chgData name="Borja Pintos Gómez de las Heras" userId="2d8300179f355a51" providerId="LiveId" clId="{46E9778C-D13C-412A-B087-5A8A2C9F16ED}" dt="2019-09-10T10:25:50.753" v="1802" actId="478"/>
+          <ac:picMkLst>
+            <pc:docMk/>
+            <pc:sldMk cId="210989054" sldId="265"/>
+            <ac:picMk id="36" creationId="{950A0288-5B67-43C4-A621-22859A7C82D2}"/>
           </ac:picMkLst>
         </pc:picChg>
         <pc:cxnChg chg="del">
-          <ac:chgData name="Borja Pintos Gómez de las Heras" userId="2d8300179f355a51" providerId="Windows Live" clId="Web-{40119FD6-485C-4960-9716-29943F131C2B}" dt="2020-02-29T09:46:26.772" v="2"/>
+          <ac:chgData name="Borja Pintos Gómez de las Heras" userId="2d8300179f355a51" providerId="LiveId" clId="{46E9778C-D13C-412A-B087-5A8A2C9F16ED}" dt="2019-09-10T09:37:19.522" v="124" actId="478"/>
           <ac:cxnSpMkLst>
             <pc:docMk/>
-            <pc:sldMk cId="757090546" sldId="272"/>
-            <ac:cxnSpMk id="9" creationId="{36C1D099-40C2-41E9-A371-DA9EF4F62AE9}"/>
+            <pc:sldMk cId="210989054" sldId="265"/>
+            <ac:cxnSpMk id="5" creationId="{765D8694-3FAA-41DD-84CE-A62A60D21316}"/>
           </ac:cxnSpMkLst>
         </pc:cxnChg>
         <pc:cxnChg chg="del">
-          <ac:chgData name="Borja Pintos Gómez de las Heras" userId="2d8300179f355a51" providerId="Windows Live" clId="Web-{40119FD6-485C-4960-9716-29943F131C2B}" dt="2020-02-29T09:46:27.507" v="3"/>
+          <ac:chgData name="Borja Pintos Gómez de las Heras" userId="2d8300179f355a51" providerId="LiveId" clId="{46E9778C-D13C-412A-B087-5A8A2C9F16ED}" dt="2019-09-10T09:37:19.522" v="124" actId="478"/>
           <ac:cxnSpMkLst>
             <pc:docMk/>
-            <pc:sldMk cId="757090546" sldId="272"/>
-            <ac:cxnSpMk id="14" creationId="{BC580C9C-5369-4726-8691-0DBBB396F59C}"/>
+            <pc:sldMk cId="210989054" sldId="265"/>
+            <ac:cxnSpMk id="6" creationId="{4E6D008B-A318-40D5-99E5-48FBC0B25720}"/>
           </ac:cxnSpMkLst>
         </pc:cxnChg>
-      </pc:sldChg>
-      <pc:sldChg chg="addSp delSp modSp add ord replId">
-        <pc:chgData name="Borja Pintos Gómez de las Heras" userId="2d8300179f355a51" providerId="Windows Live" clId="Web-{40119FD6-485C-4960-9716-29943F131C2B}" dt="2020-02-29T11:45:43.086" v="73"/>
-        <pc:sldMkLst>
-          <pc:docMk/>
-          <pc:sldMk cId="2324493193" sldId="273"/>
-        </pc:sldMkLst>
-        <pc:spChg chg="add mod ord">
-          <ac:chgData name="Borja Pintos Gómez de las Heras" userId="2d8300179f355a51" providerId="Windows Live" clId="Web-{40119FD6-485C-4960-9716-29943F131C2B}" dt="2020-02-29T11:45:43.086" v="73"/>
-          <ac:spMkLst>
-            <pc:docMk/>
-            <pc:sldMk cId="2324493193" sldId="273"/>
-            <ac:spMk id="10" creationId="{72EEAEC5-DC12-441E-83E7-23394546DD69}"/>
-          </ac:spMkLst>
-        </pc:spChg>
-        <pc:spChg chg="del">
-          <ac:chgData name="Borja Pintos Gómez de las Heras" userId="2d8300179f355a51" providerId="Windows Live" clId="Web-{40119FD6-485C-4960-9716-29943F131C2B}" dt="2020-02-29T11:45:20.789" v="67"/>
-          <ac:spMkLst>
-            <pc:docMk/>
-            <pc:sldMk cId="2324493193" sldId="273"/>
-            <ac:spMk id="12" creationId="{45D00C55-8A7F-4B05-BE63-E7BC42FC448D}"/>
-          </ac:spMkLst>
-        </pc:spChg>
-        <pc:spChg chg="del">
-          <ac:chgData name="Borja Pintos Gómez de las Heras" userId="2d8300179f355a51" providerId="Windows Live" clId="Web-{40119FD6-485C-4960-9716-29943F131C2B}" dt="2020-02-29T11:45:21.945" v="68"/>
-          <ac:spMkLst>
-            <pc:docMk/>
-            <pc:sldMk cId="2324493193" sldId="273"/>
-            <ac:spMk id="14" creationId="{A891B9AE-E2DD-45AA-AC49-6E5A7B439599}"/>
-          </ac:spMkLst>
-        </pc:spChg>
-        <pc:spChg chg="del">
-          <ac:chgData name="Borja Pintos Gómez de las Heras" userId="2d8300179f355a51" providerId="Windows Live" clId="Web-{40119FD6-485C-4960-9716-29943F131C2B}" dt="2020-02-29T11:45:12.898" v="60"/>
-          <ac:spMkLst>
-            <pc:docMk/>
-            <pc:sldMk cId="2324493193" sldId="273"/>
-            <ac:spMk id="29" creationId="{A8FCD53D-CE83-4BAA-AA3E-62B825977F90}"/>
-          </ac:spMkLst>
-        </pc:spChg>
-        <pc:spChg chg="del">
-          <ac:chgData name="Borja Pintos Gómez de las Heras" userId="2d8300179f355a51" providerId="Windows Live" clId="Web-{40119FD6-485C-4960-9716-29943F131C2B}" dt="2020-02-29T11:45:14.320" v="61"/>
-          <ac:spMkLst>
-            <pc:docMk/>
-            <pc:sldMk cId="2324493193" sldId="273"/>
-            <ac:spMk id="30" creationId="{84B5B434-D544-42AE-BDB7-B6FDB5DA5564}"/>
-          </ac:spMkLst>
-        </pc:spChg>
-        <pc:spChg chg="del">
-          <ac:chgData name="Borja Pintos Gómez de las Heras" userId="2d8300179f355a51" providerId="Windows Live" clId="Web-{40119FD6-485C-4960-9716-29943F131C2B}" dt="2020-02-29T11:45:19.023" v="66"/>
-          <ac:spMkLst>
-            <pc:docMk/>
-            <pc:sldMk cId="2324493193" sldId="273"/>
-            <ac:spMk id="33" creationId="{8EEBED0C-861D-44AD-975F-F812CFA698F4}"/>
-          </ac:spMkLst>
-        </pc:spChg>
-        <pc:spChg chg="del mod">
-          <ac:chgData name="Borja Pintos Gómez de las Heras" userId="2d8300179f355a51" providerId="Windows Live" clId="Web-{40119FD6-485C-4960-9716-29943F131C2B}" dt="2020-02-29T11:45:17.976" v="65"/>
-          <ac:spMkLst>
-            <pc:docMk/>
-            <pc:sldMk cId="2324493193" sldId="273"/>
-            <ac:spMk id="35" creationId="{90230ECD-E70A-4C96-82CC-CA6F346E68CB}"/>
-          </ac:spMkLst>
-        </pc:spChg>
+        <pc:cxnChg chg="del">
+          <ac:chgData name="Borja Pintos Gómez de las Heras" userId="2d8300179f355a51" providerId="LiveId" clId="{46E9778C-D13C-412A-B087-5A8A2C9F16ED}" dt="2019-09-10T09:37:19.522" v="124" actId="478"/>
+          <ac:cxnSpMkLst>
+            <pc:docMk/>
+            <pc:sldMk cId="210989054" sldId="265"/>
+            <ac:cxnSpMk id="8" creationId="{F4CBE6EF-22A2-4658-BE20-4FD1E43BD14B}"/>
+          </ac:cxnSpMkLst>
+        </pc:cxnChg>
+        <pc:cxnChg chg="del">
+          <ac:chgData name="Borja Pintos Gómez de las Heras" userId="2d8300179f355a51" providerId="LiveId" clId="{46E9778C-D13C-412A-B087-5A8A2C9F16ED}" dt="2019-09-10T09:37:19.522" v="124" actId="478"/>
+          <ac:cxnSpMkLst>
+            <pc:docMk/>
+            <pc:sldMk cId="210989054" sldId="265"/>
+            <ac:cxnSpMk id="9" creationId="{F02FB86C-C544-476F-9779-E32BA3D72D2F}"/>
+          </ac:cxnSpMkLst>
+        </pc:cxnChg>
+        <pc:cxnChg chg="del">
+          <ac:chgData name="Borja Pintos Gómez de las Heras" userId="2d8300179f355a51" providerId="LiveId" clId="{46E9778C-D13C-412A-B087-5A8A2C9F16ED}" dt="2019-09-10T09:37:19.522" v="124" actId="478"/>
+          <ac:cxnSpMkLst>
+            <pc:docMk/>
+            <pc:sldMk cId="210989054" sldId="265"/>
+            <ac:cxnSpMk id="10" creationId="{2ADFE535-0C62-4A2F-8E85-7B2B5E7D98FC}"/>
+          </ac:cxnSpMkLst>
+        </pc:cxnChg>
+        <pc:cxnChg chg="del">
+          <ac:chgData name="Borja Pintos Gómez de las Heras" userId="2d8300179f355a51" providerId="LiveId" clId="{46E9778C-D13C-412A-B087-5A8A2C9F16ED}" dt="2019-09-10T09:37:19.522" v="124" actId="478"/>
+          <ac:cxnSpMkLst>
+            <pc:docMk/>
+            <pc:sldMk cId="210989054" sldId="265"/>
+            <ac:cxnSpMk id="14" creationId="{72564CF0-A0F7-4C17-B039-20C32E44915B}"/>
+          </ac:cxnSpMkLst>
+        </pc:cxnChg>
+        <pc:cxnChg chg="del">
+          <ac:chgData name="Borja Pintos Gómez de las Heras" userId="2d8300179f355a51" providerId="LiveId" clId="{46E9778C-D13C-412A-B087-5A8A2C9F16ED}" dt="2019-09-10T09:37:17.378" v="123" actId="478"/>
+          <ac:cxnSpMkLst>
+            <pc:docMk/>
+            <pc:sldMk cId="210989054" sldId="265"/>
+            <ac:cxnSpMk id="16" creationId="{91E15E29-A07E-4518-99E7-5E79216C4AFF}"/>
+          </ac:cxnSpMkLst>
+        </pc:cxnChg>
+        <pc:cxnChg chg="del">
+          <ac:chgData name="Borja Pintos Gómez de las Heras" userId="2d8300179f355a51" providerId="LiveId" clId="{46E9778C-D13C-412A-B087-5A8A2C9F16ED}" dt="2019-09-10T09:37:19.522" v="124" actId="478"/>
+          <ac:cxnSpMkLst>
+            <pc:docMk/>
+            <pc:sldMk cId="210989054" sldId="265"/>
+            <ac:cxnSpMk id="17" creationId="{83AD8792-AE4D-47AE-B2E3-6279343AB8B2}"/>
+          </ac:cxnSpMkLst>
+        </pc:cxnChg>
+        <pc:cxnChg chg="del">
+          <ac:chgData name="Borja Pintos Gómez de las Heras" userId="2d8300179f355a51" providerId="LiveId" clId="{46E9778C-D13C-412A-B087-5A8A2C9F16ED}" dt="2019-09-10T10:16:43.199" v="1725" actId="478"/>
+          <ac:cxnSpMkLst>
+            <pc:docMk/>
+            <pc:sldMk cId="210989054" sldId="265"/>
+            <ac:cxnSpMk id="22" creationId="{1D82A970-9746-4148-8A68-2981C6B9D340}"/>
+          </ac:cxnSpMkLst>
+        </pc:cxnChg>
+        <pc:cxnChg chg="del">
+          <ac:chgData name="Borja Pintos Gómez de las Heras" userId="2d8300179f355a51" providerId="LiveId" clId="{46E9778C-D13C-412A-B087-5A8A2C9F16ED}" dt="2019-09-10T10:16:47.242" v="1728" actId="478"/>
+          <ac:cxnSpMkLst>
+            <pc:docMk/>
+            <pc:sldMk cId="210989054" sldId="265"/>
+            <ac:cxnSpMk id="23" creationId="{E1224081-24B6-47D2-A60E-169F50FDE6C2}"/>
+          </ac:cxnSpMkLst>
+        </pc:cxnChg>
+        <pc:cxnChg chg="del topLvl">
+          <ac:chgData name="Borja Pintos Gómez de las Heras" userId="2d8300179f355a51" providerId="LiveId" clId="{46E9778C-D13C-412A-B087-5A8A2C9F16ED}" dt="2019-09-10T10:16:48.816" v="1729" actId="478"/>
+          <ac:cxnSpMkLst>
+            <pc:docMk/>
+            <pc:sldMk cId="210989054" sldId="265"/>
+            <ac:cxnSpMk id="24" creationId="{75ADBEAE-D034-4278-9E68-73697D027249}"/>
+          </ac:cxnSpMkLst>
+        </pc:cxnChg>
       </pc:sldChg>
     </pc:docChg>
   </pc:docChgLst>
@@ -3531,274 +3684,121 @@
     </pc:docChg>
   </pc:docChgLst>
   <pc:docChgLst>
-    <pc:chgData name="Borja Pintos Gómez de las Heras" userId="2d8300179f355a51" providerId="LiveId" clId="{46E9778C-D13C-412A-B087-5A8A2C9F16ED}"/>
-    <pc:docChg chg="undo custSel addSld modSld">
-      <pc:chgData name="Borja Pintos Gómez de las Heras" userId="2d8300179f355a51" providerId="LiveId" clId="{46E9778C-D13C-412A-B087-5A8A2C9F16ED}" dt="2019-09-10T10:25:58.296" v="1804" actId="1076"/>
+    <pc:chgData name="Borja Pintos Gómez de las Heras" userId="2d8300179f355a51" providerId="Windows Live" clId="Web-{40119FD6-485C-4960-9716-29943F131C2B}"/>
+    <pc:docChg chg="addSld modSld sldOrd">
+      <pc:chgData name="Borja Pintos Gómez de las Heras" userId="2d8300179f355a51" providerId="Windows Live" clId="Web-{40119FD6-485C-4960-9716-29943F131C2B}" dt="2020-02-29T11:45:43.086" v="73"/>
       <pc:docMkLst>
         <pc:docMk/>
       </pc:docMkLst>
-      <pc:sldChg chg="addSp delSp modSp add">
-        <pc:chgData name="Borja Pintos Gómez de las Heras" userId="2d8300179f355a51" providerId="LiveId" clId="{46E9778C-D13C-412A-B087-5A8A2C9F16ED}" dt="2019-09-10T10:25:58.296" v="1804" actId="1076"/>
+      <pc:sldChg chg="addSp delSp modSp add replId">
+        <pc:chgData name="Borja Pintos Gómez de las Heras" userId="2d8300179f355a51" providerId="Windows Live" clId="Web-{40119FD6-485C-4960-9716-29943F131C2B}" dt="2020-02-29T09:51:09.869" v="57" actId="1076"/>
         <pc:sldMkLst>
           <pc:docMk/>
-          <pc:sldMk cId="210989054" sldId="265"/>
+          <pc:sldMk cId="757090546" sldId="272"/>
         </pc:sldMkLst>
-        <pc:spChg chg="mod">
-          <ac:chgData name="Borja Pintos Gómez de las Heras" userId="2d8300179f355a51" providerId="LiveId" clId="{46E9778C-D13C-412A-B087-5A8A2C9F16ED}" dt="2019-09-10T09:33:56.905" v="10" actId="20577"/>
-          <ac:spMkLst>
-            <pc:docMk/>
-            <pc:sldMk cId="210989054" sldId="265"/>
-            <ac:spMk id="2" creationId="{8C86EEF0-507D-4A7E-B493-2FCCBE8AABF0}"/>
-          </ac:spMkLst>
-        </pc:spChg>
-        <pc:spChg chg="mod">
-          <ac:chgData name="Borja Pintos Gómez de las Heras" userId="2d8300179f355a51" providerId="LiveId" clId="{46E9778C-D13C-412A-B087-5A8A2C9F16ED}" dt="2019-09-10T10:17:07.959" v="1739" actId="14100"/>
-          <ac:spMkLst>
-            <pc:docMk/>
-            <pc:sldMk cId="210989054" sldId="265"/>
-            <ac:spMk id="3" creationId="{8D1F8D79-35C0-4572-A705-DEC06E75823A}"/>
-          </ac:spMkLst>
-        </pc:spChg>
-        <pc:spChg chg="del">
-          <ac:chgData name="Borja Pintos Gómez de las Heras" userId="2d8300179f355a51" providerId="LiveId" clId="{46E9778C-D13C-412A-B087-5A8A2C9F16ED}" dt="2019-09-10T09:37:19.522" v="124" actId="478"/>
-          <ac:spMkLst>
-            <pc:docMk/>
-            <pc:sldMk cId="210989054" sldId="265"/>
-            <ac:spMk id="4" creationId="{ABB03064-2293-4FE6-99F6-C18CDB8F67FD}"/>
-          </ac:spMkLst>
-        </pc:spChg>
-        <pc:spChg chg="del">
-          <ac:chgData name="Borja Pintos Gómez de las Heras" userId="2d8300179f355a51" providerId="LiveId" clId="{46E9778C-D13C-412A-B087-5A8A2C9F16ED}" dt="2019-09-10T09:37:19.522" v="124" actId="478"/>
-          <ac:spMkLst>
-            <pc:docMk/>
-            <pc:sldMk cId="210989054" sldId="265"/>
-            <ac:spMk id="7" creationId="{DEDDF3A4-E642-4934-8AA0-5DABD9BE3E2E}"/>
-          </ac:spMkLst>
-        </pc:spChg>
-        <pc:spChg chg="del">
-          <ac:chgData name="Borja Pintos Gómez de las Heras" userId="2d8300179f355a51" providerId="LiveId" clId="{46E9778C-D13C-412A-B087-5A8A2C9F16ED}" dt="2019-09-10T09:37:19.522" v="124" actId="478"/>
-          <ac:spMkLst>
-            <pc:docMk/>
-            <pc:sldMk cId="210989054" sldId="265"/>
-            <ac:spMk id="11" creationId="{90806B90-9E5B-4F6D-B316-7DBD1AB9B0F4}"/>
-          </ac:spMkLst>
-        </pc:spChg>
-        <pc:spChg chg="del">
-          <ac:chgData name="Borja Pintos Gómez de las Heras" userId="2d8300179f355a51" providerId="LiveId" clId="{46E9778C-D13C-412A-B087-5A8A2C9F16ED}" dt="2019-09-10T09:37:21.248" v="125" actId="478"/>
-          <ac:spMkLst>
-            <pc:docMk/>
-            <pc:sldMk cId="210989054" sldId="265"/>
-            <ac:spMk id="13" creationId="{FE57C4C3-3C0E-43E9-97DA-B08283C1B83F}"/>
-          </ac:spMkLst>
-        </pc:spChg>
-        <pc:spChg chg="del">
-          <ac:chgData name="Borja Pintos Gómez de las Heras" userId="2d8300179f355a51" providerId="LiveId" clId="{46E9778C-D13C-412A-B087-5A8A2C9F16ED}" dt="2019-09-10T09:37:19.522" v="124" actId="478"/>
-          <ac:spMkLst>
-            <pc:docMk/>
-            <pc:sldMk cId="210989054" sldId="265"/>
-            <ac:spMk id="18" creationId="{F29B997D-DBAA-4172-A2D0-1473AEBBD0A5}"/>
-          </ac:spMkLst>
-        </pc:spChg>
-        <pc:spChg chg="del">
-          <ac:chgData name="Borja Pintos Gómez de las Heras" userId="2d8300179f355a51" providerId="LiveId" clId="{46E9778C-D13C-412A-B087-5A8A2C9F16ED}" dt="2019-09-10T09:37:19.522" v="124" actId="478"/>
-          <ac:spMkLst>
-            <pc:docMk/>
-            <pc:sldMk cId="210989054" sldId="265"/>
-            <ac:spMk id="19" creationId="{2C1B7245-A5B0-45D0-89C7-5E6C8CD122B3}"/>
-          </ac:spMkLst>
-        </pc:spChg>
-        <pc:spChg chg="add del mod">
-          <ac:chgData name="Borja Pintos Gómez de las Heras" userId="2d8300179f355a51" providerId="LiveId" clId="{46E9778C-D13C-412A-B087-5A8A2C9F16ED}" dt="2019-09-10T10:22:52.796" v="1752" actId="478"/>
-          <ac:spMkLst>
-            <pc:docMk/>
-            <pc:sldMk cId="210989054" sldId="265"/>
-            <ac:spMk id="25" creationId="{935D7678-5C39-4688-B188-5C1D11D2F828}"/>
-          </ac:spMkLst>
-        </pc:spChg>
-        <pc:spChg chg="add del mod">
-          <ac:chgData name="Borja Pintos Gómez de las Heras" userId="2d8300179f355a51" providerId="LiveId" clId="{46E9778C-D13C-412A-B087-5A8A2C9F16ED}" dt="2019-09-10T10:23:39.236" v="1758" actId="478"/>
-          <ac:spMkLst>
-            <pc:docMk/>
-            <pc:sldMk cId="210989054" sldId="265"/>
-            <ac:spMk id="28" creationId="{7B2B0F1E-D0EC-4390-BBBA-A358C3B7C55B}"/>
-          </ac:spMkLst>
-        </pc:spChg>
-        <pc:spChg chg="add del mod">
-          <ac:chgData name="Borja Pintos Gómez de las Heras" userId="2d8300179f355a51" providerId="LiveId" clId="{46E9778C-D13C-412A-B087-5A8A2C9F16ED}" dt="2019-09-10T10:24:16.866" v="1768" actId="478"/>
-          <ac:spMkLst>
-            <pc:docMk/>
-            <pc:sldMk cId="210989054" sldId="265"/>
-            <ac:spMk id="31" creationId="{CB96801D-9560-4573-9042-821E9C241A70}"/>
-          </ac:spMkLst>
-        </pc:spChg>
-        <pc:grpChg chg="add del mod">
-          <ac:chgData name="Borja Pintos Gómez de las Heras" userId="2d8300179f355a51" providerId="LiveId" clId="{46E9778C-D13C-412A-B087-5A8A2C9F16ED}" dt="2019-09-10T10:16:48.816" v="1729" actId="478"/>
-          <ac:grpSpMkLst>
-            <pc:docMk/>
-            <pc:sldMk cId="210989054" sldId="265"/>
-            <ac:grpSpMk id="20" creationId="{2992E48E-4956-4524-BF77-EF6AFCD851B1}"/>
-          </ac:grpSpMkLst>
-        </pc:grpChg>
-        <pc:picChg chg="add del mod">
-          <ac:chgData name="Borja Pintos Gómez de las Heras" userId="2d8300179f355a51" providerId="LiveId" clId="{46E9778C-D13C-412A-B087-5A8A2C9F16ED}" dt="2019-09-10T10:22:52.796" v="1752" actId="478"/>
+        <pc:spChg chg="add mod">
+          <ac:chgData name="Borja Pintos Gómez de las Heras" userId="2d8300179f355a51" providerId="Windows Live" clId="Web-{40119FD6-485C-4960-9716-29943F131C2B}" dt="2020-02-29T09:51:09.869" v="57" actId="1076"/>
+          <ac:spMkLst>
+            <pc:docMk/>
+            <pc:sldMk cId="757090546" sldId="272"/>
+            <ac:spMk id="6" creationId="{E515472E-848D-41C6-A29E-215523C8A9B0}"/>
+          </ac:spMkLst>
+        </pc:spChg>
+        <pc:picChg chg="add mod">
+          <ac:chgData name="Borja Pintos Gómez de las Heras" userId="2d8300179f355a51" providerId="Windows Live" clId="Web-{40119FD6-485C-4960-9716-29943F131C2B}" dt="2020-02-29T09:50:38.634" v="48" actId="14100"/>
           <ac:picMkLst>
             <pc:docMk/>
-            <pc:sldMk cId="210989054" sldId="265"/>
-            <ac:picMk id="15" creationId="{C1AA2CA9-ECF6-4E5F-AA3E-BEDDDC45E5DD}"/>
+            <pc:sldMk cId="757090546" sldId="272"/>
+            <ac:picMk id="2" creationId="{22219C0C-5A90-4368-AEDF-6B409776EE94}"/>
           </ac:picMkLst>
         </pc:picChg>
-        <pc:picChg chg="mod topLvl">
-          <ac:chgData name="Borja Pintos Gómez de las Heras" userId="2d8300179f355a51" providerId="LiveId" clId="{46E9778C-D13C-412A-B087-5A8A2C9F16ED}" dt="2019-09-10T10:19:15.936" v="1745" actId="1076"/>
+        <pc:picChg chg="del">
+          <ac:chgData name="Borja Pintos Gómez de las Heras" userId="2d8300179f355a51" providerId="Windows Live" clId="Web-{40119FD6-485C-4960-9716-29943F131C2B}" dt="2020-02-29T09:46:25.929" v="1"/>
           <ac:picMkLst>
             <pc:docMk/>
-            <pc:sldMk cId="210989054" sldId="265"/>
-            <ac:picMk id="21" creationId="{C63623EC-8823-4FE3-83D1-5A1E85E94527}"/>
-          </ac:picMkLst>
-        </pc:picChg>
-        <pc:picChg chg="add del mod">
-          <ac:chgData name="Borja Pintos Gómez de las Heras" userId="2d8300179f355a51" providerId="LiveId" clId="{46E9778C-D13C-412A-B087-5A8A2C9F16ED}" dt="2019-09-10T10:23:52.921" v="1763" actId="478"/>
-          <ac:picMkLst>
-            <pc:docMk/>
-            <pc:sldMk cId="210989054" sldId="265"/>
-            <ac:picMk id="27" creationId="{B9FE0695-A2D4-430E-8066-17C72C990C31}"/>
-          </ac:picMkLst>
-        </pc:picChg>
-        <pc:picChg chg="add mod">
-          <ac:chgData name="Borja Pintos Gómez de las Heras" userId="2d8300179f355a51" providerId="LiveId" clId="{46E9778C-D13C-412A-B087-5A8A2C9F16ED}" dt="2019-09-10T10:24:26.182" v="1772" actId="1076"/>
-          <ac:picMkLst>
-            <pc:docMk/>
-            <pc:sldMk cId="210989054" sldId="265"/>
-            <ac:picMk id="30" creationId="{03840EFE-0495-4DD0-809B-E789F3EB189E}"/>
-          </ac:picMkLst>
-        </pc:picChg>
-        <pc:picChg chg="add mod">
-          <ac:chgData name="Borja Pintos Gómez de las Heras" userId="2d8300179f355a51" providerId="LiveId" clId="{46E9778C-D13C-412A-B087-5A8A2C9F16ED}" dt="2019-09-10T10:24:50.306" v="1778" actId="1076"/>
-          <ac:picMkLst>
-            <pc:docMk/>
-            <pc:sldMk cId="210989054" sldId="265"/>
-            <ac:picMk id="32" creationId="{344B4EC8-4F80-4320-A0CC-649F9D26ACB7}"/>
-          </ac:picMkLst>
-        </pc:picChg>
-        <pc:picChg chg="add mod">
-          <ac:chgData name="Borja Pintos Gómez de las Heras" userId="2d8300179f355a51" providerId="LiveId" clId="{46E9778C-D13C-412A-B087-5A8A2C9F16ED}" dt="2019-09-10T10:25:54.687" v="1803" actId="1076"/>
-          <ac:picMkLst>
-            <pc:docMk/>
-            <pc:sldMk cId="210989054" sldId="265"/>
-            <ac:picMk id="33" creationId="{289B0977-C2EF-45F5-9235-FF834719E64A}"/>
-          </ac:picMkLst>
-        </pc:picChg>
-        <pc:picChg chg="add mod">
-          <ac:chgData name="Borja Pintos Gómez de las Heras" userId="2d8300179f355a51" providerId="LiveId" clId="{46E9778C-D13C-412A-B087-5A8A2C9F16ED}" dt="2019-09-10T10:25:38.633" v="1796" actId="1076"/>
-          <ac:picMkLst>
-            <pc:docMk/>
-            <pc:sldMk cId="210989054" sldId="265"/>
-            <ac:picMk id="34" creationId="{971C9603-E963-427D-9CFC-E7AC62406909}"/>
-          </ac:picMkLst>
-        </pc:picChg>
-        <pc:picChg chg="add mod">
-          <ac:chgData name="Borja Pintos Gómez de las Heras" userId="2d8300179f355a51" providerId="LiveId" clId="{46E9778C-D13C-412A-B087-5A8A2C9F16ED}" dt="2019-09-10T10:25:58.296" v="1804" actId="1076"/>
-          <ac:picMkLst>
-            <pc:docMk/>
-            <pc:sldMk cId="210989054" sldId="265"/>
-            <ac:picMk id="35" creationId="{68BC9635-6D07-400E-B26F-12D3E055849B}"/>
-          </ac:picMkLst>
-        </pc:picChg>
-        <pc:picChg chg="add del mod">
-          <ac:chgData name="Borja Pintos Gómez de las Heras" userId="2d8300179f355a51" providerId="LiveId" clId="{46E9778C-D13C-412A-B087-5A8A2C9F16ED}" dt="2019-09-10T10:25:50.753" v="1802" actId="478"/>
-          <ac:picMkLst>
-            <pc:docMk/>
-            <pc:sldMk cId="210989054" sldId="265"/>
-            <ac:picMk id="36" creationId="{950A0288-5B67-43C4-A621-22859A7C82D2}"/>
+            <pc:sldMk cId="757090546" sldId="272"/>
+            <ac:picMk id="3" creationId="{C5C3C493-7C12-434A-9DE1-62EA04FE518F}"/>
           </ac:picMkLst>
         </pc:picChg>
         <pc:cxnChg chg="del">
-          <ac:chgData name="Borja Pintos Gómez de las Heras" userId="2d8300179f355a51" providerId="LiveId" clId="{46E9778C-D13C-412A-B087-5A8A2C9F16ED}" dt="2019-09-10T09:37:19.522" v="124" actId="478"/>
+          <ac:chgData name="Borja Pintos Gómez de las Heras" userId="2d8300179f355a51" providerId="Windows Live" clId="Web-{40119FD6-485C-4960-9716-29943F131C2B}" dt="2020-02-29T09:46:26.772" v="2"/>
           <ac:cxnSpMkLst>
             <pc:docMk/>
-            <pc:sldMk cId="210989054" sldId="265"/>
-            <ac:cxnSpMk id="5" creationId="{765D8694-3FAA-41DD-84CE-A62A60D21316}"/>
+            <pc:sldMk cId="757090546" sldId="272"/>
+            <ac:cxnSpMk id="9" creationId="{36C1D099-40C2-41E9-A371-DA9EF4F62AE9}"/>
           </ac:cxnSpMkLst>
         </pc:cxnChg>
         <pc:cxnChg chg="del">
-          <ac:chgData name="Borja Pintos Gómez de las Heras" userId="2d8300179f355a51" providerId="LiveId" clId="{46E9778C-D13C-412A-B087-5A8A2C9F16ED}" dt="2019-09-10T09:37:19.522" v="124" actId="478"/>
+          <ac:chgData name="Borja Pintos Gómez de las Heras" userId="2d8300179f355a51" providerId="Windows Live" clId="Web-{40119FD6-485C-4960-9716-29943F131C2B}" dt="2020-02-29T09:46:27.507" v="3"/>
           <ac:cxnSpMkLst>
             <pc:docMk/>
-            <pc:sldMk cId="210989054" sldId="265"/>
-            <ac:cxnSpMk id="6" creationId="{4E6D008B-A318-40D5-99E5-48FBC0B25720}"/>
+            <pc:sldMk cId="757090546" sldId="272"/>
+            <ac:cxnSpMk id="14" creationId="{BC580C9C-5369-4726-8691-0DBBB396F59C}"/>
           </ac:cxnSpMkLst>
         </pc:cxnChg>
-        <pc:cxnChg chg="del">
-          <ac:chgData name="Borja Pintos Gómez de las Heras" userId="2d8300179f355a51" providerId="LiveId" clId="{46E9778C-D13C-412A-B087-5A8A2C9F16ED}" dt="2019-09-10T09:37:19.522" v="124" actId="478"/>
-          <ac:cxnSpMkLst>
-            <pc:docMk/>
-            <pc:sldMk cId="210989054" sldId="265"/>
-            <ac:cxnSpMk id="8" creationId="{F4CBE6EF-22A2-4658-BE20-4FD1E43BD14B}"/>
-          </ac:cxnSpMkLst>
-        </pc:cxnChg>
-        <pc:cxnChg chg="del">
-          <ac:chgData name="Borja Pintos Gómez de las Heras" userId="2d8300179f355a51" providerId="LiveId" clId="{46E9778C-D13C-412A-B087-5A8A2C9F16ED}" dt="2019-09-10T09:37:19.522" v="124" actId="478"/>
-          <ac:cxnSpMkLst>
-            <pc:docMk/>
-            <pc:sldMk cId="210989054" sldId="265"/>
-            <ac:cxnSpMk id="9" creationId="{F02FB86C-C544-476F-9779-E32BA3D72D2F}"/>
-          </ac:cxnSpMkLst>
-        </pc:cxnChg>
-        <pc:cxnChg chg="del">
-          <ac:chgData name="Borja Pintos Gómez de las Heras" userId="2d8300179f355a51" providerId="LiveId" clId="{46E9778C-D13C-412A-B087-5A8A2C9F16ED}" dt="2019-09-10T09:37:19.522" v="124" actId="478"/>
-          <ac:cxnSpMkLst>
-            <pc:docMk/>
-            <pc:sldMk cId="210989054" sldId="265"/>
-            <ac:cxnSpMk id="10" creationId="{2ADFE535-0C62-4A2F-8E85-7B2B5E7D98FC}"/>
-          </ac:cxnSpMkLst>
-        </pc:cxnChg>
-        <pc:cxnChg chg="del">
-          <ac:chgData name="Borja Pintos Gómez de las Heras" userId="2d8300179f355a51" providerId="LiveId" clId="{46E9778C-D13C-412A-B087-5A8A2C9F16ED}" dt="2019-09-10T09:37:19.522" v="124" actId="478"/>
-          <ac:cxnSpMkLst>
-            <pc:docMk/>
-            <pc:sldMk cId="210989054" sldId="265"/>
-            <ac:cxnSpMk id="14" creationId="{72564CF0-A0F7-4C17-B039-20C32E44915B}"/>
-          </ac:cxnSpMkLst>
-        </pc:cxnChg>
-        <pc:cxnChg chg="del">
-          <ac:chgData name="Borja Pintos Gómez de las Heras" userId="2d8300179f355a51" providerId="LiveId" clId="{46E9778C-D13C-412A-B087-5A8A2C9F16ED}" dt="2019-09-10T09:37:17.378" v="123" actId="478"/>
-          <ac:cxnSpMkLst>
-            <pc:docMk/>
-            <pc:sldMk cId="210989054" sldId="265"/>
-            <ac:cxnSpMk id="16" creationId="{91E15E29-A07E-4518-99E7-5E79216C4AFF}"/>
-          </ac:cxnSpMkLst>
-        </pc:cxnChg>
-        <pc:cxnChg chg="del">
-          <ac:chgData name="Borja Pintos Gómez de las Heras" userId="2d8300179f355a51" providerId="LiveId" clId="{46E9778C-D13C-412A-B087-5A8A2C9F16ED}" dt="2019-09-10T09:37:19.522" v="124" actId="478"/>
-          <ac:cxnSpMkLst>
-            <pc:docMk/>
-            <pc:sldMk cId="210989054" sldId="265"/>
-            <ac:cxnSpMk id="17" creationId="{83AD8792-AE4D-47AE-B2E3-6279343AB8B2}"/>
-          </ac:cxnSpMkLst>
-        </pc:cxnChg>
-        <pc:cxnChg chg="del">
-          <ac:chgData name="Borja Pintos Gómez de las Heras" userId="2d8300179f355a51" providerId="LiveId" clId="{46E9778C-D13C-412A-B087-5A8A2C9F16ED}" dt="2019-09-10T10:16:43.199" v="1725" actId="478"/>
-          <ac:cxnSpMkLst>
-            <pc:docMk/>
-            <pc:sldMk cId="210989054" sldId="265"/>
-            <ac:cxnSpMk id="22" creationId="{1D82A970-9746-4148-8A68-2981C6B9D340}"/>
-          </ac:cxnSpMkLst>
-        </pc:cxnChg>
-        <pc:cxnChg chg="del">
-          <ac:chgData name="Borja Pintos Gómez de las Heras" userId="2d8300179f355a51" providerId="LiveId" clId="{46E9778C-D13C-412A-B087-5A8A2C9F16ED}" dt="2019-09-10T10:16:47.242" v="1728" actId="478"/>
-          <ac:cxnSpMkLst>
-            <pc:docMk/>
-            <pc:sldMk cId="210989054" sldId="265"/>
-            <ac:cxnSpMk id="23" creationId="{E1224081-24B6-47D2-A60E-169F50FDE6C2}"/>
-          </ac:cxnSpMkLst>
-        </pc:cxnChg>
-        <pc:cxnChg chg="del topLvl">
-          <ac:chgData name="Borja Pintos Gómez de las Heras" userId="2d8300179f355a51" providerId="LiveId" clId="{46E9778C-D13C-412A-B087-5A8A2C9F16ED}" dt="2019-09-10T10:16:48.816" v="1729" actId="478"/>
-          <ac:cxnSpMkLst>
-            <pc:docMk/>
-            <pc:sldMk cId="210989054" sldId="265"/>
-            <ac:cxnSpMk id="24" creationId="{75ADBEAE-D034-4278-9E68-73697D027249}"/>
-          </ac:cxnSpMkLst>
-        </pc:cxnChg>
+      </pc:sldChg>
+      <pc:sldChg chg="addSp delSp modSp add ord replId">
+        <pc:chgData name="Borja Pintos Gómez de las Heras" userId="2d8300179f355a51" providerId="Windows Live" clId="Web-{40119FD6-485C-4960-9716-29943F131C2B}" dt="2020-02-29T11:45:43.086" v="73"/>
+        <pc:sldMkLst>
+          <pc:docMk/>
+          <pc:sldMk cId="2324493193" sldId="273"/>
+        </pc:sldMkLst>
+        <pc:spChg chg="add mod ord">
+          <ac:chgData name="Borja Pintos Gómez de las Heras" userId="2d8300179f355a51" providerId="Windows Live" clId="Web-{40119FD6-485C-4960-9716-29943F131C2B}" dt="2020-02-29T11:45:43.086" v="73"/>
+          <ac:spMkLst>
+            <pc:docMk/>
+            <pc:sldMk cId="2324493193" sldId="273"/>
+            <ac:spMk id="10" creationId="{72EEAEC5-DC12-441E-83E7-23394546DD69}"/>
+          </ac:spMkLst>
+        </pc:spChg>
+        <pc:spChg chg="del">
+          <ac:chgData name="Borja Pintos Gómez de las Heras" userId="2d8300179f355a51" providerId="Windows Live" clId="Web-{40119FD6-485C-4960-9716-29943F131C2B}" dt="2020-02-29T11:45:20.789" v="67"/>
+          <ac:spMkLst>
+            <pc:docMk/>
+            <pc:sldMk cId="2324493193" sldId="273"/>
+            <ac:spMk id="12" creationId="{45D00C55-8A7F-4B05-BE63-E7BC42FC448D}"/>
+          </ac:spMkLst>
+        </pc:spChg>
+        <pc:spChg chg="del">
+          <ac:chgData name="Borja Pintos Gómez de las Heras" userId="2d8300179f355a51" providerId="Windows Live" clId="Web-{40119FD6-485C-4960-9716-29943F131C2B}" dt="2020-02-29T11:45:21.945" v="68"/>
+          <ac:spMkLst>
+            <pc:docMk/>
+            <pc:sldMk cId="2324493193" sldId="273"/>
+            <ac:spMk id="14" creationId="{A891B9AE-E2DD-45AA-AC49-6E5A7B439599}"/>
+          </ac:spMkLst>
+        </pc:spChg>
+        <pc:spChg chg="del">
+          <ac:chgData name="Borja Pintos Gómez de las Heras" userId="2d8300179f355a51" providerId="Windows Live" clId="Web-{40119FD6-485C-4960-9716-29943F131C2B}" dt="2020-02-29T11:45:12.898" v="60"/>
+          <ac:spMkLst>
+            <pc:docMk/>
+            <pc:sldMk cId="2324493193" sldId="273"/>
+            <ac:spMk id="29" creationId="{A8FCD53D-CE83-4BAA-AA3E-62B825977F90}"/>
+          </ac:spMkLst>
+        </pc:spChg>
+        <pc:spChg chg="del">
+          <ac:chgData name="Borja Pintos Gómez de las Heras" userId="2d8300179f355a51" providerId="Windows Live" clId="Web-{40119FD6-485C-4960-9716-29943F131C2B}" dt="2020-02-29T11:45:14.320" v="61"/>
+          <ac:spMkLst>
+            <pc:docMk/>
+            <pc:sldMk cId="2324493193" sldId="273"/>
+            <ac:spMk id="30" creationId="{84B5B434-D544-42AE-BDB7-B6FDB5DA5564}"/>
+          </ac:spMkLst>
+        </pc:spChg>
+        <pc:spChg chg="del">
+          <ac:chgData name="Borja Pintos Gómez de las Heras" userId="2d8300179f355a51" providerId="Windows Live" clId="Web-{40119FD6-485C-4960-9716-29943F131C2B}" dt="2020-02-29T11:45:19.023" v="66"/>
+          <ac:spMkLst>
+            <pc:docMk/>
+            <pc:sldMk cId="2324493193" sldId="273"/>
+            <ac:spMk id="33" creationId="{8EEBED0C-861D-44AD-975F-F812CFA698F4}"/>
+          </ac:spMkLst>
+        </pc:spChg>
+        <pc:spChg chg="del mod">
+          <ac:chgData name="Borja Pintos Gómez de las Heras" userId="2d8300179f355a51" providerId="Windows Live" clId="Web-{40119FD6-485C-4960-9716-29943F131C2B}" dt="2020-02-29T11:45:17.976" v="65"/>
+          <ac:spMkLst>
+            <pc:docMk/>
+            <pc:sldMk cId="2324493193" sldId="273"/>
+            <ac:spMk id="35" creationId="{90230ECD-E70A-4C96-82CC-CA6F346E68CB}"/>
+          </ac:spMkLst>
+        </pc:spChg>
       </pc:sldChg>
     </pc:docChg>
   </pc:docChgLst>
@@ -11513,8 +11513,8 @@
             </p:nvCxnSpPr>
             <p:spPr>
               <a:xfrm flipV="1">
-                <a:off x="9035128" y="5486775"/>
-                <a:ext cx="985927" cy="3480"/>
+                <a:off x="9035128" y="5485412"/>
+                <a:ext cx="611268" cy="4845"/>
               </a:xfrm>
               <a:prstGeom prst="line">
                 <a:avLst/>
@@ -11567,8 +11567,8 @@
                 <a:solidFill>
                   <a:schemeClr val="tx1"/>
                 </a:solidFill>
-                <a:headEnd type="triangle"/>
-                <a:tailEnd type="none"/>
+                <a:headEnd type="none"/>
+                <a:tailEnd type="triangle"/>
               </a:ln>
             </p:spPr>
             <p:style>
@@ -11637,8 +11637,8 @@
               </a:fontRef>
             </p:style>
           </p:cxnSp>
-          <mc:AlternateContent xmlns:mc="http://schemas.openxmlformats.org/markup-compatibility/2006" xmlns:a14="http://schemas.microsoft.com/office/drawing/2010/main">
-            <mc:Choice Requires="a14">
+          <mc:AlternateContent xmlns:mc="http://schemas.openxmlformats.org/markup-compatibility/2006">
+            <mc:Choice xmlns:a14="http://schemas.microsoft.com/office/drawing/2010/main" Requires="a14">
               <p:sp>
                 <p:nvSpPr>
                   <p:cNvPr id="79" name="Textfeld 78">
@@ -11653,7 +11653,7 @@
                 </p:nvSpPr>
                 <p:spPr>
                   <a:xfrm>
-                    <a:off x="9194967" y="5405372"/>
+                    <a:off x="9198781" y="5370336"/>
                     <a:ext cx="930519" cy="338554"/>
                   </a:xfrm>
                   <a:prstGeom prst="rect">
@@ -11689,7 +11689,7 @@
                 </p:txBody>
               </p:sp>
             </mc:Choice>
-            <mc:Fallback xmlns="">
+            <mc:Fallback>
               <p:sp>
                 <p:nvSpPr>
                   <p:cNvPr id="79" name="Textfeld 78">
@@ -11706,7 +11706,7 @@
                 </p:nvSpPr>
                 <p:spPr>
                   <a:xfrm>
-                    <a:off x="9194967" y="5405372"/>
+                    <a:off x="9198781" y="5370336"/>
                     <a:ext cx="930519" cy="338554"/>
                   </a:xfrm>
                   <a:prstGeom prst="rect">
@@ -11985,14 +11985,14 @@
               <p:nvPr/>
             </p:nvSpPr>
             <p:spPr>
-              <a:xfrm rot="2966574">
-                <a:off x="9595891" y="5242581"/>
-                <a:ext cx="359654" cy="357644"/>
+              <a:xfrm rot="1342827">
+                <a:off x="9317245" y="5307778"/>
+                <a:ext cx="479620" cy="475303"/>
               </a:xfrm>
               <a:prstGeom prst="arc">
                 <a:avLst>
-                  <a:gd name="adj1" fmla="val 17237987"/>
-                  <a:gd name="adj2" fmla="val 20028330"/>
+                  <a:gd name="adj1" fmla="val 17587053"/>
+                  <a:gd name="adj2" fmla="val 1088379"/>
                 </a:avLst>
               </a:prstGeom>
               <a:ln>
@@ -12026,8 +12026,8 @@
               </a:p>
             </p:txBody>
           </p:sp>
-          <mc:AlternateContent xmlns:mc="http://schemas.openxmlformats.org/markup-compatibility/2006" xmlns:a14="http://schemas.microsoft.com/office/drawing/2010/main">
-            <mc:Choice Requires="a14">
+          <mc:AlternateContent xmlns:mc="http://schemas.openxmlformats.org/markup-compatibility/2006">
+            <mc:Choice xmlns:a14="http://schemas.microsoft.com/office/drawing/2010/main" Requires="a14">
               <p:sp>
                 <p:nvSpPr>
                   <p:cNvPr id="99" name="Textfeld 98">
@@ -12042,7 +12042,7 @@
                 </p:nvSpPr>
                 <p:spPr>
                   <a:xfrm>
-                    <a:off x="9650108" y="5245468"/>
+                    <a:off x="9423968" y="5336647"/>
                     <a:ext cx="930519" cy="338554"/>
                   </a:xfrm>
                   <a:prstGeom prst="rect">
@@ -12078,7 +12078,7 @@
                 </p:txBody>
               </p:sp>
             </mc:Choice>
-            <mc:Fallback xmlns="">
+            <mc:Fallback>
               <p:sp>
                 <p:nvSpPr>
                   <p:cNvPr id="99" name="Textfeld 98">
@@ -12095,7 +12095,7 @@
                 </p:nvSpPr>
                 <p:spPr>
                   <a:xfrm>
-                    <a:off x="9650108" y="5245468"/>
+                    <a:off x="9423968" y="5336647"/>
                     <a:ext cx="930519" cy="338554"/>
                   </a:xfrm>
                   <a:prstGeom prst="rect">
@@ -12701,8 +12701,8 @@
           </a:p>
         </p:txBody>
       </p:sp>
-      <mc:AlternateContent xmlns:mc="http://schemas.openxmlformats.org/markup-compatibility/2006">
-        <mc:Choice xmlns:a14="http://schemas.microsoft.com/office/drawing/2010/main" Requires="a14">
+      <mc:AlternateContent xmlns:mc="http://schemas.openxmlformats.org/markup-compatibility/2006" xmlns:a14="http://schemas.microsoft.com/office/drawing/2010/main">
+        <mc:Choice Requires="a14">
           <p:sp>
             <p:nvSpPr>
               <p:cNvPr id="3" name="Content Placeholder 2">
@@ -13541,7 +13541,7 @@
             </p:txBody>
           </p:sp>
         </mc:Choice>
-        <mc:Fallback>
+        <mc:Fallback xmlns="">
           <p:sp>
             <p:nvSpPr>
               <p:cNvPr id="3" name="Content Placeholder 2">

</xml_diff>